<commit_message>
streamlined notebook added Theory section on Gradient Descent moved the 2d-plot stuff into the helper module
</commit_message>
<xml_diff>
--- a/logistic_regression/pics/perc.pptx
+++ b/logistic_regression/pics/perc.pptx
@@ -104,6 +104,11 @@
       </a:defRPr>
     </a:lvl9pPr>
   </p:defaultTextStyle>
+  <p:extLst>
+    <p:ext uri="{EFAFB233-063F-42B5-8137-9DF3F51BA10A}">
+      <p15:sldGuideLst xmlns:p15="http://schemas.microsoft.com/office/powerpoint/2012/main"/>
+    </p:ext>
+  </p:extLst>
 </p:presentation>
 </file>
 
@@ -254,7 +259,7 @@
           <a:p>
             <a:fld id="{95C9C945-6086-B246-BB53-7510ED701B45}" type="datetimeFigureOut">
               <a:rPr lang="de-DE" smtClean="0"/>
-              <a:t>01.03.20</a:t>
+              <a:t>02.03.20</a:t>
             </a:fld>
             <a:endParaRPr lang="de-DE"/>
           </a:p>
@@ -452,7 +457,7 @@
           <a:p>
             <a:fld id="{95C9C945-6086-B246-BB53-7510ED701B45}" type="datetimeFigureOut">
               <a:rPr lang="de-DE" smtClean="0"/>
-              <a:t>01.03.20</a:t>
+              <a:t>02.03.20</a:t>
             </a:fld>
             <a:endParaRPr lang="de-DE"/>
           </a:p>
@@ -660,7 +665,7 @@
           <a:p>
             <a:fld id="{95C9C945-6086-B246-BB53-7510ED701B45}" type="datetimeFigureOut">
               <a:rPr lang="de-DE" smtClean="0"/>
-              <a:t>01.03.20</a:t>
+              <a:t>02.03.20</a:t>
             </a:fld>
             <a:endParaRPr lang="de-DE"/>
           </a:p>
@@ -858,7 +863,7 @@
           <a:p>
             <a:fld id="{95C9C945-6086-B246-BB53-7510ED701B45}" type="datetimeFigureOut">
               <a:rPr lang="de-DE" smtClean="0"/>
-              <a:t>01.03.20</a:t>
+              <a:t>02.03.20</a:t>
             </a:fld>
             <a:endParaRPr lang="de-DE"/>
           </a:p>
@@ -1133,7 +1138,7 @@
           <a:p>
             <a:fld id="{95C9C945-6086-B246-BB53-7510ED701B45}" type="datetimeFigureOut">
               <a:rPr lang="de-DE" smtClean="0"/>
-              <a:t>01.03.20</a:t>
+              <a:t>02.03.20</a:t>
             </a:fld>
             <a:endParaRPr lang="de-DE"/>
           </a:p>
@@ -1398,7 +1403,7 @@
           <a:p>
             <a:fld id="{95C9C945-6086-B246-BB53-7510ED701B45}" type="datetimeFigureOut">
               <a:rPr lang="de-DE" smtClean="0"/>
-              <a:t>01.03.20</a:t>
+              <a:t>02.03.20</a:t>
             </a:fld>
             <a:endParaRPr lang="de-DE"/>
           </a:p>
@@ -1810,7 +1815,7 @@
           <a:p>
             <a:fld id="{95C9C945-6086-B246-BB53-7510ED701B45}" type="datetimeFigureOut">
               <a:rPr lang="de-DE" smtClean="0"/>
-              <a:t>01.03.20</a:t>
+              <a:t>02.03.20</a:t>
             </a:fld>
             <a:endParaRPr lang="de-DE"/>
           </a:p>
@@ -1951,7 +1956,7 @@
           <a:p>
             <a:fld id="{95C9C945-6086-B246-BB53-7510ED701B45}" type="datetimeFigureOut">
               <a:rPr lang="de-DE" smtClean="0"/>
-              <a:t>01.03.20</a:t>
+              <a:t>02.03.20</a:t>
             </a:fld>
             <a:endParaRPr lang="de-DE"/>
           </a:p>
@@ -2064,7 +2069,7 @@
           <a:p>
             <a:fld id="{95C9C945-6086-B246-BB53-7510ED701B45}" type="datetimeFigureOut">
               <a:rPr lang="de-DE" smtClean="0"/>
-              <a:t>01.03.20</a:t>
+              <a:t>02.03.20</a:t>
             </a:fld>
             <a:endParaRPr lang="de-DE"/>
           </a:p>
@@ -2375,7 +2380,7 @@
           <a:p>
             <a:fld id="{95C9C945-6086-B246-BB53-7510ED701B45}" type="datetimeFigureOut">
               <a:rPr lang="de-DE" smtClean="0"/>
-              <a:t>01.03.20</a:t>
+              <a:t>02.03.20</a:t>
             </a:fld>
             <a:endParaRPr lang="de-DE"/>
           </a:p>
@@ -2663,7 +2668,7 @@
           <a:p>
             <a:fld id="{95C9C945-6086-B246-BB53-7510ED701B45}" type="datetimeFigureOut">
               <a:rPr lang="de-DE" smtClean="0"/>
-              <a:t>01.03.20</a:t>
+              <a:t>02.03.20</a:t>
             </a:fld>
             <a:endParaRPr lang="de-DE"/>
           </a:p>
@@ -2904,7 +2909,7 @@
           <a:p>
             <a:fld id="{95C9C945-6086-B246-BB53-7510ED701B45}" type="datetimeFigureOut">
               <a:rPr lang="de-DE" smtClean="0"/>
-              <a:t>01.03.20</a:t>
+              <a:t>02.03.20</a:t>
             </a:fld>
             <a:endParaRPr lang="de-DE"/>
           </a:p>
@@ -3555,8 +3560,8 @@
           </a:p>
         </p:txBody>
       </p:sp>
-      <mc:AlternateContent xmlns:mc="http://schemas.openxmlformats.org/markup-compatibility/2006">
-        <mc:Choice xmlns:a14="http://schemas.microsoft.com/office/drawing/2010/main" Requires="a14">
+      <mc:AlternateContent xmlns:mc="http://schemas.openxmlformats.org/markup-compatibility/2006" xmlns:a14="http://schemas.microsoft.com/office/drawing/2010/main">
+        <mc:Choice Requires="a14">
           <p:sp>
             <p:nvSpPr>
               <p:cNvPr id="11" name="Textfeld 10">
@@ -3585,6 +3590,7 @@
               </a:bodyPr>
               <a:lstStyle/>
               <a:p>
+                <a:pPr/>
                 <a14:m>
                   <m:oMathPara xmlns:m="http://schemas.openxmlformats.org/officeDocument/2006/math">
                     <m:oMathParaPr>
@@ -3624,7 +3630,7 @@
             </p:txBody>
           </p:sp>
         </mc:Choice>
-        <mc:Fallback>
+        <mc:Fallback xmlns="">
           <p:sp>
             <p:nvSpPr>
               <p:cNvPr id="11" name="Textfeld 10">
@@ -3768,8 +3774,8 @@
           </a:fontRef>
         </p:style>
       </p:cxnSp>
-      <mc:AlternateContent xmlns:mc="http://schemas.openxmlformats.org/markup-compatibility/2006">
-        <mc:Choice xmlns:a14="http://schemas.microsoft.com/office/drawing/2010/main" Requires="a14">
+      <mc:AlternateContent xmlns:mc="http://schemas.openxmlformats.org/markup-compatibility/2006" xmlns:a14="http://schemas.microsoft.com/office/drawing/2010/main">
+        <mc:Choice Requires="a14">
           <p:sp>
             <p:nvSpPr>
               <p:cNvPr id="14" name="Textfeld 13">
@@ -3798,6 +3804,7 @@
               </a:bodyPr>
               <a:lstStyle/>
               <a:p>
+                <a:pPr/>
                 <a14:m>
                   <m:oMathPara xmlns:m="http://schemas.openxmlformats.org/officeDocument/2006/math">
                     <m:oMathParaPr>
@@ -3837,7 +3844,7 @@
             </p:txBody>
           </p:sp>
         </mc:Choice>
-        <mc:Fallback>
+        <mc:Fallback xmlns="">
           <p:sp>
             <p:nvSpPr>
               <p:cNvPr id="14" name="Textfeld 13">
@@ -3981,8 +3988,8 @@
           </a:fontRef>
         </p:style>
       </p:cxnSp>
-      <mc:AlternateContent xmlns:mc="http://schemas.openxmlformats.org/markup-compatibility/2006">
-        <mc:Choice xmlns:a14="http://schemas.microsoft.com/office/drawing/2010/main" Requires="a14">
+      <mc:AlternateContent xmlns:mc="http://schemas.openxmlformats.org/markup-compatibility/2006" xmlns:a14="http://schemas.microsoft.com/office/drawing/2010/main">
+        <mc:Choice Requires="a14">
           <p:sp>
             <p:nvSpPr>
               <p:cNvPr id="17" name="Textfeld 16">
@@ -4011,6 +4018,7 @@
               </a:bodyPr>
               <a:lstStyle/>
               <a:p>
+                <a:pPr/>
                 <a14:m>
                   <m:oMathPara xmlns:m="http://schemas.openxmlformats.org/officeDocument/2006/math">
                     <m:oMathParaPr>
@@ -4050,7 +4058,7 @@
             </p:txBody>
           </p:sp>
         </mc:Choice>
-        <mc:Fallback>
+        <mc:Fallback xmlns="">
           <p:sp>
             <p:nvSpPr>
               <p:cNvPr id="17" name="Textfeld 16">
@@ -4150,8 +4158,8 @@
           </a:p>
         </p:txBody>
       </p:sp>
-      <mc:AlternateContent xmlns:mc="http://schemas.openxmlformats.org/markup-compatibility/2006">
-        <mc:Choice xmlns:a14="http://schemas.microsoft.com/office/drawing/2010/main" Requires="a14">
+      <mc:AlternateContent xmlns:mc="http://schemas.openxmlformats.org/markup-compatibility/2006" xmlns:a14="http://schemas.microsoft.com/office/drawing/2010/main">
+        <mc:Choice Requires="a14">
           <p:sp>
             <p:nvSpPr>
               <p:cNvPr id="27" name="Textfeld 26">
@@ -4180,6 +4188,7 @@
               </a:bodyPr>
               <a:lstStyle/>
               <a:p>
+                <a:pPr/>
                 <a14:m>
                   <m:oMathPara xmlns:m="http://schemas.openxmlformats.org/officeDocument/2006/math">
                     <m:oMathParaPr>
@@ -4209,7 +4218,7 @@
             </p:txBody>
           </p:sp>
         </mc:Choice>
-        <mc:Fallback>
+        <mc:Fallback xmlns="">
           <p:sp>
             <p:nvSpPr>
               <p:cNvPr id="27" name="Textfeld 26">
@@ -4547,8 +4556,8 @@
           </a:p>
         </p:txBody>
       </p:sp>
-      <mc:AlternateContent xmlns:mc="http://schemas.openxmlformats.org/markup-compatibility/2006">
-        <mc:Choice xmlns:a14="http://schemas.microsoft.com/office/drawing/2010/main" Requires="a14">
+      <mc:AlternateContent xmlns:mc="http://schemas.openxmlformats.org/markup-compatibility/2006" xmlns:a14="http://schemas.microsoft.com/office/drawing/2010/main">
+        <mc:Choice Requires="a14">
           <p:sp>
             <p:nvSpPr>
               <p:cNvPr id="41" name="Textfeld 40">
@@ -4577,6 +4586,7 @@
               </a:bodyPr>
               <a:lstStyle/>
               <a:p>
+                <a:pPr/>
                 <a14:m>
                   <m:oMathPara xmlns:m="http://schemas.openxmlformats.org/officeDocument/2006/math">
                     <m:oMathParaPr>
@@ -4597,7 +4607,7 @@
             </p:txBody>
           </p:sp>
         </mc:Choice>
-        <mc:Fallback>
+        <mc:Fallback xmlns="">
           <p:sp>
             <p:nvSpPr>
               <p:cNvPr id="41" name="Textfeld 40">
@@ -4656,7 +4666,7 @@
         </p:nvSpPr>
         <p:spPr>
           <a:xfrm>
-            <a:off x="2601065" y="4856394"/>
+            <a:off x="2465859" y="1378847"/>
             <a:ext cx="774571" cy="369332"/>
           </a:xfrm>
           <a:prstGeom prst="rect">
@@ -4691,7 +4701,7 @@
         </p:nvSpPr>
         <p:spPr>
           <a:xfrm>
-            <a:off x="3474807" y="4854186"/>
+            <a:off x="3339601" y="1376639"/>
             <a:ext cx="945131" cy="369332"/>
           </a:xfrm>
           <a:prstGeom prst="rect">
@@ -4727,7 +4737,7 @@
         </p:nvSpPr>
         <p:spPr>
           <a:xfrm>
-            <a:off x="4629311" y="4854186"/>
+            <a:off x="4494105" y="1376639"/>
             <a:ext cx="596638" cy="369332"/>
           </a:xfrm>
           <a:prstGeom prst="rect">
@@ -4763,7 +4773,7 @@
         </p:nvSpPr>
         <p:spPr>
           <a:xfrm>
-            <a:off x="5445114" y="4854186"/>
+            <a:off x="5350852" y="1376639"/>
             <a:ext cx="1460656" cy="369332"/>
           </a:xfrm>
           <a:prstGeom prst="rect">
@@ -4803,7 +4813,7 @@
         </p:nvSpPr>
         <p:spPr>
           <a:xfrm>
-            <a:off x="7065611" y="4854186"/>
+            <a:off x="7039589" y="1376639"/>
             <a:ext cx="856325" cy="369332"/>
           </a:xfrm>
           <a:prstGeom prst="rect">
@@ -4824,8 +4834,8 @@
           </a:p>
         </p:txBody>
       </p:sp>
-      <mc:AlternateContent xmlns:mc="http://schemas.openxmlformats.org/markup-compatibility/2006">
-        <mc:Choice xmlns:a14="http://schemas.microsoft.com/office/drawing/2010/main" Requires="a14">
+      <mc:AlternateContent xmlns:mc="http://schemas.openxmlformats.org/markup-compatibility/2006" xmlns:a14="http://schemas.microsoft.com/office/drawing/2010/main">
+        <mc:Choice Requires="a14">
           <p:sp>
             <p:nvSpPr>
               <p:cNvPr id="53" name="Rechteck 52">
@@ -4853,6 +4863,7 @@
               </a:bodyPr>
               <a:lstStyle/>
               <a:p>
+                <a:pPr/>
                 <a14:m>
                   <m:oMathPara xmlns:m="http://schemas.openxmlformats.org/officeDocument/2006/math">
                     <m:oMathParaPr>
@@ -4892,7 +4903,7 @@
             </p:txBody>
           </p:sp>
         </mc:Choice>
-        <mc:Fallback>
+        <mc:Fallback xmlns="">
           <p:sp>
             <p:nvSpPr>
               <p:cNvPr id="53" name="Rechteck 52">
@@ -4937,8 +4948,8 @@
           </p:sp>
         </mc:Fallback>
       </mc:AlternateContent>
-      <mc:AlternateContent xmlns:mc="http://schemas.openxmlformats.org/markup-compatibility/2006">
-        <mc:Choice xmlns:a14="http://schemas.microsoft.com/office/drawing/2010/main" Requires="a14">
+      <mc:AlternateContent xmlns:mc="http://schemas.openxmlformats.org/markup-compatibility/2006" xmlns:a14="http://schemas.microsoft.com/office/drawing/2010/main">
+        <mc:Choice Requires="a14">
           <p:sp>
             <p:nvSpPr>
               <p:cNvPr id="54" name="Rechteck 53">
@@ -4966,6 +4977,7 @@
               </a:bodyPr>
               <a:lstStyle/>
               <a:p>
+                <a:pPr/>
                 <a14:m>
                   <m:oMathPara xmlns:m="http://schemas.openxmlformats.org/officeDocument/2006/math">
                     <m:oMathParaPr>
@@ -5005,7 +5017,7 @@
             </p:txBody>
           </p:sp>
         </mc:Choice>
-        <mc:Fallback>
+        <mc:Fallback xmlns="">
           <p:sp>
             <p:nvSpPr>
               <p:cNvPr id="54" name="Rechteck 53">
@@ -5050,8 +5062,8 @@
           </p:sp>
         </mc:Fallback>
       </mc:AlternateContent>
-      <mc:AlternateContent xmlns:mc="http://schemas.openxmlformats.org/markup-compatibility/2006">
-        <mc:Choice xmlns:a14="http://schemas.microsoft.com/office/drawing/2010/main" Requires="a14">
+      <mc:AlternateContent xmlns:mc="http://schemas.openxmlformats.org/markup-compatibility/2006" xmlns:a14="http://schemas.microsoft.com/office/drawing/2010/main">
+        <mc:Choice Requires="a14">
           <p:sp>
             <p:nvSpPr>
               <p:cNvPr id="55" name="Rechteck 54">
@@ -5079,6 +5091,7 @@
               </a:bodyPr>
               <a:lstStyle/>
               <a:p>
+                <a:pPr/>
                 <a14:m>
                   <m:oMathPara xmlns:m="http://schemas.openxmlformats.org/officeDocument/2006/math">
                     <m:oMathParaPr>
@@ -5118,7 +5131,7 @@
             </p:txBody>
           </p:sp>
         </mc:Choice>
-        <mc:Fallback>
+        <mc:Fallback xmlns="">
           <p:sp>
             <p:nvSpPr>
               <p:cNvPr id="55" name="Rechteck 54">
@@ -5163,8 +5176,8 @@
           </p:sp>
         </mc:Fallback>
       </mc:AlternateContent>
-      <mc:AlternateContent xmlns:mc="http://schemas.openxmlformats.org/markup-compatibility/2006">
-        <mc:Choice xmlns:a14="http://schemas.microsoft.com/office/drawing/2010/main" Requires="a14">
+      <mc:AlternateContent xmlns:mc="http://schemas.openxmlformats.org/markup-compatibility/2006" xmlns:a14="http://schemas.microsoft.com/office/drawing/2010/main">
+        <mc:Choice Requires="a14">
           <p:sp>
             <p:nvSpPr>
               <p:cNvPr id="56" name="Rechteck 55">
@@ -5192,6 +5205,7 @@
               </a:bodyPr>
               <a:lstStyle/>
               <a:p>
+                <a:pPr/>
                 <a14:m>
                   <m:oMathPara xmlns:m="http://schemas.openxmlformats.org/officeDocument/2006/math">
                     <m:oMathParaPr>
@@ -5231,7 +5245,7 @@
             </p:txBody>
           </p:sp>
         </mc:Choice>
-        <mc:Fallback>
+        <mc:Fallback xmlns="">
           <p:sp>
             <p:nvSpPr>
               <p:cNvPr id="56" name="Rechteck 55">
@@ -5276,6 +5290,547 @@
           </p:sp>
         </mc:Fallback>
       </mc:AlternateContent>
+      <mc:AlternateContent xmlns:mc="http://schemas.openxmlformats.org/markup-compatibility/2006">
+        <mc:Choice xmlns:a14="http://schemas.microsoft.com/office/drawing/2010/main" Requires="a14">
+          <p:sp>
+            <p:nvSpPr>
+              <p:cNvPr id="34" name="Textfeld 33">
+                <a:extLst>
+                  <a:ext uri="{FF2B5EF4-FFF2-40B4-BE49-F238E27FC236}">
+                    <a16:creationId xmlns:a16="http://schemas.microsoft.com/office/drawing/2014/main" id="{17E3AD67-215E-BA4A-B41F-405D603E7F4D}"/>
+                  </a:ext>
+                </a:extLst>
+              </p:cNvPr>
+              <p:cNvSpPr txBox="1"/>
+              <p:nvPr/>
+            </p:nvSpPr>
+            <p:spPr>
+              <a:xfrm>
+                <a:off x="1047916" y="1990817"/>
+                <a:ext cx="1253228" cy="369332"/>
+              </a:xfrm>
+              <a:prstGeom prst="rect">
+                <a:avLst/>
+              </a:prstGeom>
+              <a:noFill/>
+            </p:spPr>
+            <p:txBody>
+              <a:bodyPr wrap="none" rtlCol="0">
+                <a:spAutoFit/>
+              </a:bodyPr>
+              <a:lstStyle/>
+              <a:p>
+                <a:r>
+                  <a:rPr lang="de-DE" dirty="0">
+                    <a:solidFill>
+                      <a:schemeClr val="accent6"/>
+                    </a:solidFill>
+                  </a:rPr>
+                  <a:t>Bias </a:t>
+                </a:r>
+                <a:r>
+                  <a:rPr lang="de-DE" dirty="0" err="1">
+                    <a:solidFill>
+                      <a:schemeClr val="accent6"/>
+                    </a:solidFill>
+                  </a:rPr>
+                  <a:t>term</a:t>
+                </a:r>
+                <a:r>
+                  <a:rPr lang="de-DE" dirty="0">
+                    <a:solidFill>
+                      <a:schemeClr val="accent6"/>
+                    </a:solidFill>
+                  </a:rPr>
+                  <a:t> </a:t>
+                </a:r>
+                <a14:m>
+                  <m:oMath xmlns:m="http://schemas.openxmlformats.org/officeDocument/2006/math">
+                    <m:r>
+                      <a:rPr lang="de-CH" b="0" i="1" smtClean="0">
+                        <a:solidFill>
+                          <a:schemeClr val="accent6"/>
+                        </a:solidFill>
+                        <a:latin typeface="Cambria Math" panose="02040503050406030204" pitchFamily="18" charset="0"/>
+                      </a:rPr>
+                      <m:t>𝑏</m:t>
+                    </m:r>
+                  </m:oMath>
+                </a14:m>
+                <a:endParaRPr lang="de-DE" i="1" dirty="0">
+                  <a:solidFill>
+                    <a:schemeClr val="accent6"/>
+                  </a:solidFill>
+                </a:endParaRPr>
+              </a:p>
+            </p:txBody>
+          </p:sp>
+        </mc:Choice>
+        <mc:Fallback>
+          <p:sp>
+            <p:nvSpPr>
+              <p:cNvPr id="34" name="Textfeld 33">
+                <a:extLst>
+                  <a:ext uri="{FF2B5EF4-FFF2-40B4-BE49-F238E27FC236}">
+                    <a16:creationId xmlns:a16="http://schemas.microsoft.com/office/drawing/2014/main" id="{17E3AD67-215E-BA4A-B41F-405D603E7F4D}"/>
+                  </a:ext>
+                </a:extLst>
+              </p:cNvPr>
+              <p:cNvSpPr txBox="1">
+                <a:spLocks noRot="1" noChangeAspect="1" noMove="1" noResize="1" noEditPoints="1" noAdjustHandles="1" noChangeArrowheads="1" noChangeShapeType="1" noTextEdit="1"/>
+              </p:cNvSpPr>
+              <p:nvPr/>
+            </p:nvSpPr>
+            <p:spPr>
+              <a:xfrm>
+                <a:off x="1047916" y="1990817"/>
+                <a:ext cx="1253228" cy="369332"/>
+              </a:xfrm>
+              <a:prstGeom prst="rect">
+                <a:avLst/>
+              </a:prstGeom>
+              <a:blipFill>
+                <a:blip r:embed="rId11"/>
+                <a:stretch>
+                  <a:fillRect l="-4040" t="-6667" b="-23333"/>
+                </a:stretch>
+              </a:blipFill>
+            </p:spPr>
+            <p:txBody>
+              <a:bodyPr/>
+              <a:lstStyle/>
+              <a:p>
+                <a:r>
+                  <a:rPr lang="de-DE">
+                    <a:noFill/>
+                  </a:rPr>
+                  <a:t> </a:t>
+                </a:r>
+              </a:p>
+            </p:txBody>
+          </p:sp>
+        </mc:Fallback>
+      </mc:AlternateContent>
+      <mc:AlternateContent xmlns:mc="http://schemas.openxmlformats.org/markup-compatibility/2006">
+        <mc:Choice xmlns:a14="http://schemas.microsoft.com/office/drawing/2010/main" Requires="a14">
+          <p:sp>
+            <p:nvSpPr>
+              <p:cNvPr id="9" name="Textfeld 8">
+                <a:extLst>
+                  <a:ext uri="{FF2B5EF4-FFF2-40B4-BE49-F238E27FC236}">
+                    <a16:creationId xmlns:a16="http://schemas.microsoft.com/office/drawing/2014/main" id="{0B8DA192-C68B-8B49-85F4-F306DFEE0D48}"/>
+                  </a:ext>
+                </a:extLst>
+              </p:cNvPr>
+              <p:cNvSpPr txBox="1"/>
+              <p:nvPr/>
+            </p:nvSpPr>
+            <p:spPr>
+              <a:xfrm>
+                <a:off x="3723693" y="5025747"/>
+                <a:ext cx="1593128" cy="276999"/>
+              </a:xfrm>
+              <a:prstGeom prst="rect">
+                <a:avLst/>
+              </a:prstGeom>
+              <a:noFill/>
+            </p:spPr>
+            <p:txBody>
+              <a:bodyPr wrap="none" lIns="0" tIns="0" rIns="0" bIns="0" rtlCol="0">
+                <a:spAutoFit/>
+              </a:bodyPr>
+              <a:lstStyle/>
+              <a:p>
+                <a14:m>
+                  <m:oMathPara xmlns:m="http://schemas.openxmlformats.org/officeDocument/2006/math">
+                    <m:oMathParaPr>
+                      <m:jc m:val="centerGroup"/>
+                    </m:oMathParaPr>
+                    <m:oMath xmlns:m="http://schemas.openxmlformats.org/officeDocument/2006/math">
+                      <m:r>
+                        <a:rPr lang="de-CH" b="0" i="1" smtClean="0">
+                          <a:latin typeface="Cambria Math" panose="02040503050406030204" pitchFamily="18" charset="0"/>
+                        </a:rPr>
+                        <m:t>𝑍</m:t>
+                      </m:r>
+                      <m:r>
+                        <a:rPr lang="de-CH" b="0" i="1" smtClean="0">
+                          <a:latin typeface="Cambria Math" panose="02040503050406030204" pitchFamily="18" charset="0"/>
+                        </a:rPr>
+                        <m:t>=</m:t>
+                      </m:r>
+                      <m:r>
+                        <a:rPr lang="de-CH" b="0" i="1" smtClean="0">
+                          <a:latin typeface="Cambria Math" panose="02040503050406030204" pitchFamily="18" charset="0"/>
+                        </a:rPr>
+                        <m:t>𝑋</m:t>
+                      </m:r>
+                      <m:r>
+                        <a:rPr lang="de-CH" b="0" i="1" smtClean="0">
+                          <a:latin typeface="Cambria Math" panose="02040503050406030204" pitchFamily="18" charset="0"/>
+                          <a:ea typeface="Cambria Math" panose="02040503050406030204" pitchFamily="18" charset="0"/>
+                        </a:rPr>
+                        <m:t>∙</m:t>
+                      </m:r>
+                      <m:r>
+                        <a:rPr lang="de-CH" b="0" i="1" smtClean="0">
+                          <a:latin typeface="Cambria Math" panose="02040503050406030204" pitchFamily="18" charset="0"/>
+                          <a:ea typeface="Cambria Math" panose="02040503050406030204" pitchFamily="18" charset="0"/>
+                        </a:rPr>
+                        <m:t>𝑊</m:t>
+                      </m:r>
+                      <m:r>
+                        <a:rPr lang="de-CH" b="0" i="1" smtClean="0">
+                          <a:latin typeface="Cambria Math" panose="02040503050406030204" pitchFamily="18" charset="0"/>
+                          <a:ea typeface="Cambria Math" panose="02040503050406030204" pitchFamily="18" charset="0"/>
+                        </a:rPr>
+                        <m:t>+</m:t>
+                      </m:r>
+                      <m:sSub>
+                        <m:sSubPr>
+                          <m:ctrlPr>
+                            <a:rPr lang="de-CH" b="0" i="1" smtClean="0">
+                              <a:latin typeface="Cambria Math" panose="02040503050406030204" pitchFamily="18" charset="0"/>
+                              <a:ea typeface="Cambria Math" panose="02040503050406030204" pitchFamily="18" charset="0"/>
+                            </a:rPr>
+                          </m:ctrlPr>
+                        </m:sSubPr>
+                        <m:e>
+                          <m:r>
+                            <a:rPr lang="de-CH" b="0" i="1" smtClean="0">
+                              <a:latin typeface="Cambria Math" panose="02040503050406030204" pitchFamily="18" charset="0"/>
+                              <a:ea typeface="Cambria Math" panose="02040503050406030204" pitchFamily="18" charset="0"/>
+                            </a:rPr>
+                            <m:t>𝑤</m:t>
+                          </m:r>
+                        </m:e>
+                        <m:sub>
+                          <m:r>
+                            <a:rPr lang="de-CH" b="0" i="1" smtClean="0">
+                              <a:latin typeface="Cambria Math" panose="02040503050406030204" pitchFamily="18" charset="0"/>
+                              <a:ea typeface="Cambria Math" panose="02040503050406030204" pitchFamily="18" charset="0"/>
+                            </a:rPr>
+                            <m:t>0</m:t>
+                          </m:r>
+                        </m:sub>
+                      </m:sSub>
+                    </m:oMath>
+                  </m:oMathPara>
+                </a14:m>
+                <a:endParaRPr lang="de-DE" dirty="0"/>
+              </a:p>
+            </p:txBody>
+          </p:sp>
+        </mc:Choice>
+        <mc:Fallback>
+          <p:sp>
+            <p:nvSpPr>
+              <p:cNvPr id="9" name="Textfeld 8">
+                <a:extLst>
+                  <a:ext uri="{FF2B5EF4-FFF2-40B4-BE49-F238E27FC236}">
+                    <a16:creationId xmlns:a16="http://schemas.microsoft.com/office/drawing/2014/main" id="{0B8DA192-C68B-8B49-85F4-F306DFEE0D48}"/>
+                  </a:ext>
+                </a:extLst>
+              </p:cNvPr>
+              <p:cNvSpPr txBox="1">
+                <a:spLocks noRot="1" noChangeAspect="1" noMove="1" noResize="1" noEditPoints="1" noAdjustHandles="1" noChangeArrowheads="1" noChangeShapeType="1" noTextEdit="1"/>
+              </p:cNvSpPr>
+              <p:nvPr/>
+            </p:nvSpPr>
+            <p:spPr>
+              <a:xfrm>
+                <a:off x="3723693" y="5025747"/>
+                <a:ext cx="1593128" cy="276999"/>
+              </a:xfrm>
+              <a:prstGeom prst="rect">
+                <a:avLst/>
+              </a:prstGeom>
+              <a:blipFill>
+                <a:blip r:embed="rId12"/>
+                <a:stretch>
+                  <a:fillRect l="-2362" b="-9091"/>
+                </a:stretch>
+              </a:blipFill>
+            </p:spPr>
+            <p:txBody>
+              <a:bodyPr/>
+              <a:lstStyle/>
+              <a:p>
+                <a:r>
+                  <a:rPr lang="de-DE">
+                    <a:noFill/>
+                  </a:rPr>
+                  <a:t> </a:t>
+                </a:r>
+              </a:p>
+            </p:txBody>
+          </p:sp>
+        </mc:Fallback>
+      </mc:AlternateContent>
+      <mc:AlternateContent xmlns:mc="http://schemas.openxmlformats.org/markup-compatibility/2006">
+        <mc:Choice xmlns:a14="http://schemas.microsoft.com/office/drawing/2010/main" Requires="a14">
+          <p:sp>
+            <p:nvSpPr>
+              <p:cNvPr id="18" name="Textfeld 17">
+                <a:extLst>
+                  <a:ext uri="{FF2B5EF4-FFF2-40B4-BE49-F238E27FC236}">
+                    <a16:creationId xmlns:a16="http://schemas.microsoft.com/office/drawing/2014/main" id="{B3A88FBD-5C02-5245-8EF6-6CCB5DAA482E}"/>
+                  </a:ext>
+                </a:extLst>
+              </p:cNvPr>
+              <p:cNvSpPr txBox="1"/>
+              <p:nvPr/>
+            </p:nvSpPr>
+            <p:spPr>
+              <a:xfrm>
+                <a:off x="5573727" y="4870548"/>
+                <a:ext cx="1583062" cy="525016"/>
+              </a:xfrm>
+              <a:prstGeom prst="rect">
+                <a:avLst/>
+              </a:prstGeom>
+              <a:noFill/>
+            </p:spPr>
+            <p:txBody>
+              <a:bodyPr wrap="none" lIns="0" tIns="0" rIns="0" bIns="0" rtlCol="0">
+                <a:spAutoFit/>
+              </a:bodyPr>
+              <a:lstStyle/>
+              <a:p>
+                <a14:m>
+                  <m:oMathPara xmlns:m="http://schemas.openxmlformats.org/officeDocument/2006/math">
+                    <m:oMathParaPr>
+                      <m:jc m:val="centerGroup"/>
+                    </m:oMathParaPr>
+                    <m:oMath xmlns:m="http://schemas.openxmlformats.org/officeDocument/2006/math">
+                      <m:r>
+                        <a:rPr lang="de-DE" i="1" smtClean="0">
+                          <a:latin typeface="Cambria Math" panose="02040503050406030204" pitchFamily="18" charset="0"/>
+                          <a:ea typeface="Cambria Math" panose="02040503050406030204" pitchFamily="18" charset="0"/>
+                        </a:rPr>
+                        <m:t>𝜎</m:t>
+                      </m:r>
+                      <m:d>
+                        <m:dPr>
+                          <m:ctrlPr>
+                            <a:rPr lang="de-CH" b="0" i="1" smtClean="0">
+                              <a:latin typeface="Cambria Math" panose="02040503050406030204" pitchFamily="18" charset="0"/>
+                              <a:ea typeface="Cambria Math" panose="02040503050406030204" pitchFamily="18" charset="0"/>
+                            </a:rPr>
+                          </m:ctrlPr>
+                        </m:dPr>
+                        <m:e>
+                          <m:r>
+                            <a:rPr lang="de-CH" b="0" i="1" smtClean="0">
+                              <a:latin typeface="Cambria Math" panose="02040503050406030204" pitchFamily="18" charset="0"/>
+                              <a:ea typeface="Cambria Math" panose="02040503050406030204" pitchFamily="18" charset="0"/>
+                            </a:rPr>
+                            <m:t>𝑍</m:t>
+                          </m:r>
+                        </m:e>
+                      </m:d>
+                      <m:r>
+                        <a:rPr lang="de-CH" b="0" i="1" smtClean="0">
+                          <a:latin typeface="Cambria Math" panose="02040503050406030204" pitchFamily="18" charset="0"/>
+                          <a:ea typeface="Cambria Math" panose="02040503050406030204" pitchFamily="18" charset="0"/>
+                        </a:rPr>
+                        <m:t>=</m:t>
+                      </m:r>
+                      <m:f>
+                        <m:fPr>
+                          <m:ctrlPr>
+                            <a:rPr lang="de-CH" b="0" i="1" smtClean="0">
+                              <a:latin typeface="Cambria Math" panose="02040503050406030204" pitchFamily="18" charset="0"/>
+                              <a:ea typeface="Cambria Math" panose="02040503050406030204" pitchFamily="18" charset="0"/>
+                            </a:rPr>
+                          </m:ctrlPr>
+                        </m:fPr>
+                        <m:num>
+                          <m:r>
+                            <a:rPr lang="de-CH" b="0" i="1" smtClean="0">
+                              <a:latin typeface="Cambria Math" panose="02040503050406030204" pitchFamily="18" charset="0"/>
+                              <a:ea typeface="Cambria Math" panose="02040503050406030204" pitchFamily="18" charset="0"/>
+                            </a:rPr>
+                            <m:t>1</m:t>
+                          </m:r>
+                        </m:num>
+                        <m:den>
+                          <m:r>
+                            <a:rPr lang="de-CH" b="0" i="1" smtClean="0">
+                              <a:latin typeface="Cambria Math" panose="02040503050406030204" pitchFamily="18" charset="0"/>
+                              <a:ea typeface="Cambria Math" panose="02040503050406030204" pitchFamily="18" charset="0"/>
+                            </a:rPr>
+                            <m:t>1+</m:t>
+                          </m:r>
+                          <m:sSup>
+                            <m:sSupPr>
+                              <m:ctrlPr>
+                                <a:rPr lang="de-CH" b="0" i="1" smtClean="0">
+                                  <a:latin typeface="Cambria Math" panose="02040503050406030204" pitchFamily="18" charset="0"/>
+                                  <a:ea typeface="Cambria Math" panose="02040503050406030204" pitchFamily="18" charset="0"/>
+                                </a:rPr>
+                              </m:ctrlPr>
+                            </m:sSupPr>
+                            <m:e>
+                              <m:r>
+                                <a:rPr lang="de-CH" b="0" i="1" smtClean="0">
+                                  <a:latin typeface="Cambria Math" panose="02040503050406030204" pitchFamily="18" charset="0"/>
+                                  <a:ea typeface="Cambria Math" panose="02040503050406030204" pitchFamily="18" charset="0"/>
+                                </a:rPr>
+                                <m:t>𝑒</m:t>
+                              </m:r>
+                            </m:e>
+                            <m:sup>
+                              <m:r>
+                                <a:rPr lang="de-CH" b="0" i="1" smtClean="0">
+                                  <a:latin typeface="Cambria Math" panose="02040503050406030204" pitchFamily="18" charset="0"/>
+                                  <a:ea typeface="Cambria Math" panose="02040503050406030204" pitchFamily="18" charset="0"/>
+                                </a:rPr>
+                                <m:t>−</m:t>
+                              </m:r>
+                              <m:r>
+                                <a:rPr lang="de-CH" b="0" i="1" smtClean="0">
+                                  <a:latin typeface="Cambria Math" panose="02040503050406030204" pitchFamily="18" charset="0"/>
+                                  <a:ea typeface="Cambria Math" panose="02040503050406030204" pitchFamily="18" charset="0"/>
+                                </a:rPr>
+                                <m:t>𝑧</m:t>
+                              </m:r>
+                            </m:sup>
+                          </m:sSup>
+                        </m:den>
+                      </m:f>
+                    </m:oMath>
+                  </m:oMathPara>
+                </a14:m>
+                <a:endParaRPr lang="de-DE" dirty="0"/>
+              </a:p>
+            </p:txBody>
+          </p:sp>
+        </mc:Choice>
+        <mc:Fallback>
+          <p:sp>
+            <p:nvSpPr>
+              <p:cNvPr id="18" name="Textfeld 17">
+                <a:extLst>
+                  <a:ext uri="{FF2B5EF4-FFF2-40B4-BE49-F238E27FC236}">
+                    <a16:creationId xmlns:a16="http://schemas.microsoft.com/office/drawing/2014/main" id="{B3A88FBD-5C02-5245-8EF6-6CCB5DAA482E}"/>
+                  </a:ext>
+                </a:extLst>
+              </p:cNvPr>
+              <p:cNvSpPr txBox="1">
+                <a:spLocks noRot="1" noChangeAspect="1" noMove="1" noResize="1" noEditPoints="1" noAdjustHandles="1" noChangeArrowheads="1" noChangeShapeType="1" noTextEdit="1"/>
+              </p:cNvSpPr>
+              <p:nvPr/>
+            </p:nvSpPr>
+            <p:spPr>
+              <a:xfrm>
+                <a:off x="5573727" y="4870548"/>
+                <a:ext cx="1583062" cy="525016"/>
+              </a:xfrm>
+              <a:prstGeom prst="rect">
+                <a:avLst/>
+              </a:prstGeom>
+              <a:blipFill>
+                <a:blip r:embed="rId13"/>
+                <a:stretch>
+                  <a:fillRect l="-794" t="-7317" b="-9756"/>
+                </a:stretch>
+              </a:blipFill>
+            </p:spPr>
+            <p:txBody>
+              <a:bodyPr/>
+              <a:lstStyle/>
+              <a:p>
+                <a:r>
+                  <a:rPr lang="de-DE">
+                    <a:noFill/>
+                  </a:rPr>
+                  <a:t> </a:t>
+                </a:r>
+              </a:p>
+            </p:txBody>
+          </p:sp>
+        </mc:Fallback>
+      </mc:AlternateContent>
+      <p:cxnSp>
+        <p:nvCxnSpPr>
+          <p:cNvPr id="20" name="Gerade Verbindung mit Pfeil 19">
+            <a:extLst>
+              <a:ext uri="{FF2B5EF4-FFF2-40B4-BE49-F238E27FC236}">
+                <a16:creationId xmlns:a16="http://schemas.microsoft.com/office/drawing/2014/main" id="{6C928FD1-EC08-1C4C-9547-34F4B4C807C9}"/>
+              </a:ext>
+            </a:extLst>
+          </p:cNvPr>
+          <p:cNvCxnSpPr>
+            <a:cxnSpLocks/>
+          </p:cNvCxnSpPr>
+          <p:nvPr/>
+        </p:nvCxnSpPr>
+        <p:spPr>
+          <a:xfrm>
+            <a:off x="2816723" y="1130531"/>
+            <a:ext cx="4664732" cy="0"/>
+          </a:xfrm>
+          <a:prstGeom prst="straightConnector1">
+            <a:avLst/>
+          </a:prstGeom>
+          <a:ln w="28575">
+            <a:solidFill>
+              <a:schemeClr val="tx1"/>
+            </a:solidFill>
+            <a:tailEnd type="triangle"/>
+          </a:ln>
+        </p:spPr>
+        <p:style>
+          <a:lnRef idx="1">
+            <a:schemeClr val="accent1"/>
+          </a:lnRef>
+          <a:fillRef idx="0">
+            <a:schemeClr val="accent1"/>
+          </a:fillRef>
+          <a:effectRef idx="0">
+            <a:schemeClr val="accent1"/>
+          </a:effectRef>
+          <a:fontRef idx="minor">
+            <a:schemeClr val="tx1"/>
+          </a:fontRef>
+        </p:style>
+      </p:cxnSp>
+      <p:sp>
+        <p:nvSpPr>
+          <p:cNvPr id="22" name="Textfeld 21">
+            <a:extLst>
+              <a:ext uri="{FF2B5EF4-FFF2-40B4-BE49-F238E27FC236}">
+                <a16:creationId xmlns:a16="http://schemas.microsoft.com/office/drawing/2014/main" id="{BEFD900F-43D5-3E46-A3B2-C3FF85B2710A}"/>
+              </a:ext>
+            </a:extLst>
+          </p:cNvPr>
+          <p:cNvSpPr txBox="1"/>
+          <p:nvPr/>
+        </p:nvSpPr>
+        <p:spPr>
+          <a:xfrm>
+            <a:off x="4212491" y="681411"/>
+            <a:ext cx="1419235" cy="369332"/>
+          </a:xfrm>
+          <a:prstGeom prst="rect">
+            <a:avLst/>
+          </a:prstGeom>
+          <a:noFill/>
+        </p:spPr>
+        <p:txBody>
+          <a:bodyPr wrap="none" rtlCol="0">
+            <a:spAutoFit/>
+          </a:bodyPr>
+          <a:lstStyle/>
+          <a:p>
+            <a:r>
+              <a:rPr lang="de-DE" dirty="0"/>
+              <a:t>Forward Pass</a:t>
+            </a:r>
+          </a:p>
+        </p:txBody>
+      </p:sp>
     </p:spTree>
     <p:extLst>
       <p:ext uri="{BB962C8B-B14F-4D97-AF65-F5344CB8AC3E}">

</xml_diff>